<commit_message>
The powerpoint, for serious this time.
</commit_message>
<xml_diff>
--- a/Documentation/Unity Game Development Plan.pptx
+++ b/Documentation/Unity Game Development Plan.pptx
@@ -4,6 +4,9 @@
   <p:sldMasterIdLst>
     <p:sldMasterId id="2147483648" r:id="rId1"/>
   </p:sldMasterIdLst>
+  <p:handoutMasterIdLst>
+    <p:handoutMasterId r:id="rId10"/>
+  </p:handoutMasterIdLst>
   <p:sldIdLst>
     <p:sldId id="256" r:id="rId2"/>
     <p:sldId id="257" r:id="rId3"/>
@@ -15,7 +18,7 @@
     <p:sldId id="263" r:id="rId9"/>
   </p:sldIdLst>
   <p:sldSz cx="12192000" cy="6858000"/>
-  <p:notesSz cx="6858000" cy="9144000"/>
+  <p:notesSz cx="9312275" cy="6858000"/>
   <p:defaultTextStyle>
     <a:defPPr>
       <a:defRPr lang="en-US"/>
@@ -111,7 +114,189 @@
       </a:defRPr>
     </a:lvl9pPr>
   </p:defaultTextStyle>
+  <p:extLst>
+    <p:ext uri="{EFAFB233-063F-42B5-8137-9DF3F51BA10A}">
+      <p15:sldGuideLst xmlns:p15="http://schemas.microsoft.com/office/powerpoint/2012/main"/>
+    </p:ext>
+  </p:extLst>
 </p:presentation>
+</file>
+
+<file path=ppt/commentAuthors.xml><?xml version="1.0" encoding="utf-8"?>
+<p:cmAuthorLst xmlns:a="http://schemas.openxmlformats.org/drawingml/2006/main" xmlns:r="http://schemas.openxmlformats.org/officeDocument/2006/relationships" xmlns:p="http://schemas.openxmlformats.org/presentationml/2006/main">
+  <p:cmAuthor id="1" name="MOHIT KUMAR" initials="MK" lastIdx="1" clrIdx="0">
+    <p:extLst>
+      <p:ext uri="{19B8F6BF-5375-455C-9EA6-DF929625EA0E}">
+        <p15:presenceInfo xmlns:p15="http://schemas.microsoft.com/office/powerpoint/2012/main" userId="d6d4b6b8c2c2eb6b" providerId="Windows Live"/>
+      </p:ext>
+    </p:extLst>
+  </p:cmAuthor>
+</p:cmAuthorLst>
+</file>
+
+<file path=ppt/handoutMasters/handoutMaster1.xml><?xml version="1.0" encoding="utf-8"?>
+<p:handoutMaster xmlns:a="http://schemas.openxmlformats.org/drawingml/2006/main" xmlns:r="http://schemas.openxmlformats.org/officeDocument/2006/relationships" xmlns:p="http://schemas.openxmlformats.org/presentationml/2006/main">
+  <p:cSld>
+    <p:bg>
+      <p:bgRef idx="1001">
+        <a:schemeClr val="bg1"/>
+      </p:bgRef>
+    </p:bg>
+    <p:spTree>
+      <p:nvGrpSpPr>
+        <p:cNvPr id="1" name=""/>
+        <p:cNvGrpSpPr/>
+        <p:nvPr/>
+      </p:nvGrpSpPr>
+      <p:grpSpPr>
+        <a:xfrm>
+          <a:off x="0" y="0"/>
+          <a:ext cx="0" cy="0"/>
+          <a:chOff x="0" y="0"/>
+          <a:chExt cx="0" cy="0"/>
+        </a:xfrm>
+      </p:grpSpPr>
+      <p:sp>
+        <p:nvSpPr>
+          <p:cNvPr id="2" name="Header Placeholder 1"/>
+          <p:cNvSpPr>
+            <a:spLocks noGrp="1"/>
+          </p:cNvSpPr>
+          <p:nvPr>
+            <p:ph type="hdr" sz="quarter"/>
+          </p:nvPr>
+        </p:nvSpPr>
+        <p:spPr>
+          <a:xfrm>
+            <a:off x="0" y="1"/>
+            <a:ext cx="4035319" cy="344091"/>
+          </a:xfrm>
+          <a:prstGeom prst="rect">
+            <a:avLst/>
+          </a:prstGeom>
+        </p:spPr>
+        <p:txBody>
+          <a:bodyPr vert="horz" lIns="91440" tIns="45720" rIns="91440" bIns="45720" rtlCol="0"/>
+          <a:lstStyle>
+            <a:lvl1pPr algn="l">
+              <a:defRPr sz="1200"/>
+            </a:lvl1pPr>
+          </a:lstStyle>
+          <a:p>
+            <a:endParaRPr lang="en-US"/>
+          </a:p>
+        </p:txBody>
+      </p:sp>
+      <p:sp>
+        <p:nvSpPr>
+          <p:cNvPr id="3" name="Date Placeholder 2"/>
+          <p:cNvSpPr>
+            <a:spLocks noGrp="1"/>
+          </p:cNvSpPr>
+          <p:nvPr>
+            <p:ph type="dt" sz="quarter" idx="1"/>
+          </p:nvPr>
+        </p:nvSpPr>
+        <p:spPr>
+          <a:xfrm>
+            <a:off x="5274801" y="1"/>
+            <a:ext cx="4035319" cy="344091"/>
+          </a:xfrm>
+          <a:prstGeom prst="rect">
+            <a:avLst/>
+          </a:prstGeom>
+        </p:spPr>
+        <p:txBody>
+          <a:bodyPr vert="horz" lIns="91440" tIns="45720" rIns="91440" bIns="45720" rtlCol="0"/>
+          <a:lstStyle>
+            <a:lvl1pPr algn="r">
+              <a:defRPr sz="1200"/>
+            </a:lvl1pPr>
+          </a:lstStyle>
+          <a:p>
+            <a:fld id="{36F12CB1-DABA-4CBD-967D-6A1DEAF14A26}" type="datetimeFigureOut">
+              <a:rPr lang="en-US" smtClean="0"/>
+              <a:t>2/2/2015</a:t>
+            </a:fld>
+            <a:endParaRPr lang="en-US"/>
+          </a:p>
+        </p:txBody>
+      </p:sp>
+      <p:sp>
+        <p:nvSpPr>
+          <p:cNvPr id="4" name="Footer Placeholder 3"/>
+          <p:cNvSpPr>
+            <a:spLocks noGrp="1"/>
+          </p:cNvSpPr>
+          <p:nvPr>
+            <p:ph type="ftr" sz="quarter" idx="2"/>
+          </p:nvPr>
+        </p:nvSpPr>
+        <p:spPr>
+          <a:xfrm>
+            <a:off x="0" y="6513910"/>
+            <a:ext cx="4035319" cy="344090"/>
+          </a:xfrm>
+          <a:prstGeom prst="rect">
+            <a:avLst/>
+          </a:prstGeom>
+        </p:spPr>
+        <p:txBody>
+          <a:bodyPr vert="horz" lIns="91440" tIns="45720" rIns="91440" bIns="45720" rtlCol="0" anchor="b"/>
+          <a:lstStyle>
+            <a:lvl1pPr algn="l">
+              <a:defRPr sz="1200"/>
+            </a:lvl1pPr>
+          </a:lstStyle>
+          <a:p>
+            <a:endParaRPr lang="en-US"/>
+          </a:p>
+        </p:txBody>
+      </p:sp>
+      <p:sp>
+        <p:nvSpPr>
+          <p:cNvPr id="5" name="Slide Number Placeholder 4"/>
+          <p:cNvSpPr>
+            <a:spLocks noGrp="1"/>
+          </p:cNvSpPr>
+          <p:nvPr>
+            <p:ph type="sldNum" sz="quarter" idx="3"/>
+          </p:nvPr>
+        </p:nvSpPr>
+        <p:spPr>
+          <a:xfrm>
+            <a:off x="5274801" y="6513910"/>
+            <a:ext cx="4035319" cy="344090"/>
+          </a:xfrm>
+          <a:prstGeom prst="rect">
+            <a:avLst/>
+          </a:prstGeom>
+        </p:spPr>
+        <p:txBody>
+          <a:bodyPr vert="horz" lIns="91440" tIns="45720" rIns="91440" bIns="45720" rtlCol="0" anchor="b"/>
+          <a:lstStyle>
+            <a:lvl1pPr algn="r">
+              <a:defRPr sz="1200"/>
+            </a:lvl1pPr>
+          </a:lstStyle>
+          <a:p>
+            <a:fld id="{229AB145-7637-4A3A-BFAF-D4FF9CB2FC42}" type="slidenum">
+              <a:rPr lang="en-US" smtClean="0"/>
+              <a:t>‹#›</a:t>
+            </a:fld>
+            <a:endParaRPr lang="en-US"/>
+          </a:p>
+        </p:txBody>
+      </p:sp>
+    </p:spTree>
+    <p:extLst>
+      <p:ext uri="{BB962C8B-B14F-4D97-AF65-F5344CB8AC3E}">
+        <p14:creationId xmlns:p14="http://schemas.microsoft.com/office/powerpoint/2010/main" val="2896395100"/>
+      </p:ext>
+    </p:extLst>
+  </p:cSld>
+  <p:clrMap bg1="lt1" tx1="dk1" bg2="lt2" tx2="dk2" accent1="accent1" accent2="accent2" accent3="accent3" accent4="accent4" accent5="accent5" accent6="accent6" hlink="hlink" folHlink="folHlink"/>
+</p:handoutMaster>
 </file>
 
 <file path=ppt/slideLayouts/slideLayout1.xml><?xml version="1.0" encoding="utf-8"?>
@@ -340,7 +525,7 @@
           <a:p>
             <a:fld id="{4BDF68E2-58F2-4D09-BE8B-E3BD06533059}" type="datetimeFigureOut">
               <a:rPr lang="en-US" dirty="0"/>
-              <a:t>2/1/2015</a:t>
+              <a:t>2/2/2015</a:t>
             </a:fld>
             <a:endParaRPr lang="en-US" dirty="0"/>
           </a:p>
@@ -543,7 +728,7 @@
           <a:p>
             <a:fld id="{2E2D6473-DF6D-4702-B328-E0DD40540A4E}" type="datetimeFigureOut">
               <a:rPr lang="en-US" dirty="0"/>
-              <a:t>2/1/2015</a:t>
+              <a:t>2/2/2015</a:t>
             </a:fld>
             <a:endParaRPr lang="en-US" dirty="0"/>
           </a:p>
@@ -794,7 +979,7 @@
           <a:p>
             <a:fld id="{E26F7E3A-B166-407D-9866-32884E7D5B37}" type="datetimeFigureOut">
               <a:rPr lang="en-US" dirty="0"/>
-              <a:t>2/1/2015</a:t>
+              <a:t>2/2/2015</a:t>
             </a:fld>
             <a:endParaRPr lang="en-US" dirty="0"/>
           </a:p>
@@ -963,7 +1148,7 @@
           <a:p>
             <a:fld id="{528FC5F6-F338-4AE4-BB23-26385BCFC423}" type="datetimeFigureOut">
               <a:rPr lang="en-US" dirty="0"/>
-              <a:t>2/1/2015</a:t>
+              <a:t>2/2/2015</a:t>
             </a:fld>
             <a:endParaRPr lang="en-US" dirty="0"/>
           </a:p>
@@ -1301,7 +1486,7 @@
           <a:p>
             <a:fld id="{20EBB0C4-6273-4C6E-B9BD-2EDC30F1CD52}" type="datetimeFigureOut">
               <a:rPr lang="en-US" dirty="0"/>
-              <a:t>2/1/2015</a:t>
+              <a:t>2/2/2015</a:t>
             </a:fld>
             <a:endParaRPr lang="en-US" dirty="0"/>
           </a:p>
@@ -1571,7 +1756,7 @@
           <a:p>
             <a:fld id="{19AB4D41-86C1-4908-B66A-0B50CEB3BF29}" type="datetimeFigureOut">
               <a:rPr lang="en-US" dirty="0"/>
-              <a:t>2/1/2015</a:t>
+              <a:t>2/2/2015</a:t>
             </a:fld>
             <a:endParaRPr lang="en-US" dirty="0"/>
           </a:p>
@@ -1945,7 +2130,7 @@
           <a:p>
             <a:fld id="{E6426E2C-56C1-4E0D-A793-0088A7FDD37E}" type="datetimeFigureOut">
               <a:rPr lang="en-US" dirty="0"/>
-              <a:t>2/1/2015</a:t>
+              <a:t>2/2/2015</a:t>
             </a:fld>
             <a:endParaRPr lang="en-US" dirty="0"/>
           </a:p>
@@ -2058,7 +2243,7 @@
           <a:p>
             <a:fld id="{C8C39B41-D8B5-4052-B551-9B5525EAA8B6}" type="datetimeFigureOut">
               <a:rPr lang="en-US" dirty="0"/>
-              <a:t>2/1/2015</a:t>
+              <a:t>2/2/2015</a:t>
             </a:fld>
             <a:endParaRPr lang="en-US" dirty="0"/>
           </a:p>
@@ -2224,7 +2409,7 @@
           <a:p>
             <a:fld id="{4D94136C-8742-45B2-AF27-D93DF72833A9}" type="datetimeFigureOut">
               <a:rPr lang="en-US" dirty="0"/>
-              <a:t>2/1/2015</a:t>
+              <a:t>2/2/2015</a:t>
             </a:fld>
             <a:endParaRPr lang="en-US" dirty="0"/>
           </a:p>
@@ -2574,7 +2759,7 @@
           <a:p>
             <a:fld id="{32ABBEA6-7C60-4B02-AE87-00D78D8422AF}" type="datetimeFigureOut">
               <a:rPr lang="en-US" dirty="0"/>
-              <a:t>2/1/2015</a:t>
+              <a:t>2/2/2015</a:t>
             </a:fld>
             <a:endParaRPr lang="en-US" dirty="0"/>
           </a:p>
@@ -2952,7 +3137,7 @@
           <a:p>
             <a:fld id="{C9CAD897-D46E-4AD2-BD9B-49DD3E640873}" type="datetimeFigureOut">
               <a:rPr lang="en-US" dirty="0"/>
-              <a:t>2/1/2015</a:t>
+              <a:t>2/2/2015</a:t>
             </a:fld>
             <a:endParaRPr lang="en-US" dirty="0"/>
           </a:p>
@@ -3234,7 +3419,7 @@
           <a:p>
             <a:fld id="{98624D31-43A5-475A-80CF-332C9F6DCF35}" type="datetimeFigureOut">
               <a:rPr lang="en-US" dirty="0"/>
-              <a:t>2/1/2015</a:t>
+              <a:t>2/2/2015</a:t>
             </a:fld>
             <a:endParaRPr lang="en-US" dirty="0"/>
           </a:p>
@@ -3819,6 +4004,13 @@
   <p:clrMapOvr>
     <a:masterClrMapping/>
   </p:clrMapOvr>
+  <p:timing>
+    <p:tnLst>
+      <p:par>
+        <p:cTn id="1" dur="indefinite" restart="never" nodeType="tmRoot"/>
+      </p:par>
+    </p:tnLst>
+  </p:timing>
 </p:sld>
 </file>
 
@@ -3882,7 +4074,7 @@
               <a:buChar char="o"/>
             </a:pPr>
             <a:r>
-              <a:rPr lang="en-US" dirty="0" smtClean="0"/>
+              <a:rPr lang="en-US" sz="2800" dirty="0" smtClean="0"/>
               <a:t>Collaboration between Wayne State and CCS Students to create a video game</a:t>
             </a:r>
           </a:p>
@@ -3892,7 +4084,7 @@
               <a:buChar char="o"/>
             </a:pPr>
             <a:r>
-              <a:rPr lang="en-US" dirty="0" smtClean="0"/>
+              <a:rPr lang="en-US" sz="2800" dirty="0" smtClean="0"/>
               <a:t>Combine programming skills of WSU students with art/design skills of CCS students</a:t>
             </a:r>
           </a:p>
@@ -3905,6 +4097,60 @@
           </a:p>
         </p:txBody>
       </p:sp>
+      <p:pic>
+        <p:nvPicPr>
+          <p:cNvPr id="5" name="Shape 118"/>
+          <p:cNvPicPr preferRelativeResize="0"/>
+          <p:nvPr/>
+        </p:nvPicPr>
+        <p:blipFill rotWithShape="1">
+          <a:blip r:embed="rId2">
+            <a:alphaModFix/>
+          </a:blip>
+          <a:srcRect/>
+          <a:stretch/>
+        </p:blipFill>
+        <p:spPr>
+          <a:xfrm>
+            <a:off x="1097280" y="3527058"/>
+            <a:ext cx="3393920" cy="2450410"/>
+          </a:xfrm>
+          <a:prstGeom prst="rect">
+            <a:avLst/>
+          </a:prstGeom>
+          <a:noFill/>
+          <a:ln>
+            <a:noFill/>
+          </a:ln>
+        </p:spPr>
+      </p:pic>
+      <p:pic>
+        <p:nvPicPr>
+          <p:cNvPr id="6" name="Shape 91"/>
+          <p:cNvPicPr preferRelativeResize="0"/>
+          <p:nvPr/>
+        </p:nvPicPr>
+        <p:blipFill rotWithShape="1">
+          <a:blip r:embed="rId3">
+            <a:alphaModFix/>
+          </a:blip>
+          <a:srcRect/>
+          <a:stretch/>
+        </p:blipFill>
+        <p:spPr>
+          <a:xfrm>
+            <a:off x="9250853" y="3576658"/>
+            <a:ext cx="1904827" cy="2292436"/>
+          </a:xfrm>
+          <a:prstGeom prst="rect">
+            <a:avLst/>
+          </a:prstGeom>
+          <a:noFill/>
+          <a:ln>
+            <a:noFill/>
+          </a:ln>
+        </p:spPr>
+      </p:pic>
     </p:spTree>
     <p:extLst>
       <p:ext uri="{BB962C8B-B14F-4D97-AF65-F5344CB8AC3E}">
@@ -3915,6 +4161,13 @@
   <p:clrMapOvr>
     <a:masterClrMapping/>
   </p:clrMapOvr>
+  <p:timing>
+    <p:tnLst>
+      <p:par>
+        <p:cTn id="1" dur="indefinite" restart="never" nodeType="tmRoot"/>
+      </p:par>
+    </p:tnLst>
+  </p:timing>
 </p:sld>
 </file>
 
@@ -3935,6 +4188,33 @@
           <a:chExt cx="0" cy="0"/>
         </a:xfrm>
       </p:grpSpPr>
+      <p:pic>
+        <p:nvPicPr>
+          <p:cNvPr id="4" name="Shape 92"/>
+          <p:cNvPicPr preferRelativeResize="0"/>
+          <p:nvPr/>
+        </p:nvPicPr>
+        <p:blipFill rotWithShape="1">
+          <a:blip r:embed="rId2">
+            <a:alphaModFix/>
+          </a:blip>
+          <a:srcRect/>
+          <a:stretch/>
+        </p:blipFill>
+        <p:spPr>
+          <a:xfrm>
+            <a:off x="9225153" y="3526085"/>
+            <a:ext cx="2085975" cy="4095749"/>
+          </a:xfrm>
+          <a:prstGeom prst="rect">
+            <a:avLst/>
+          </a:prstGeom>
+          <a:noFill/>
+          <a:ln>
+            <a:noFill/>
+          </a:ln>
+        </p:spPr>
+      </p:pic>
       <p:sp>
         <p:nvSpPr>
           <p:cNvPr id="2" name="Title 1"/>
@@ -3970,7 +4250,9 @@
         </p:nvSpPr>
         <p:spPr/>
         <p:txBody>
-          <a:bodyPr/>
+          <a:bodyPr>
+            <a:normAutofit/>
+          </a:bodyPr>
           <a:lstStyle/>
           <a:p>
             <a:pPr>
@@ -3978,7 +4260,7 @@
               <a:buChar char="o"/>
             </a:pPr>
             <a:r>
-              <a:rPr lang="en-US" dirty="0" smtClean="0"/>
+              <a:rPr lang="en-US" sz="2800" dirty="0" smtClean="0"/>
               <a:t>Create fully playable demo using assets created by team of artists</a:t>
             </a:r>
           </a:p>
@@ -3988,9 +4270,22 @@
               <a:buChar char="o"/>
             </a:pPr>
             <a:r>
-              <a:rPr lang="en-US" dirty="0" smtClean="0"/>
-              <a:t>Demonstrate gameplay elements such as combat, exploration, puzzle solving, and interaction</a:t>
-            </a:r>
+              <a:rPr lang="en-US" sz="2800" dirty="0" smtClean="0"/>
+              <a:t>Demonstrate gameplay elements such as combat, exploration, </a:t>
+            </a:r>
+            <a:r>
+              <a:rPr lang="en-US" sz="2800" dirty="0" smtClean="0"/>
+              <a:t>solving puzzles, </a:t>
+            </a:r>
+            <a:r>
+              <a:rPr lang="en-US" sz="2800" dirty="0" smtClean="0"/>
+              <a:t>and </a:t>
+            </a:r>
+            <a:r>
+              <a:rPr lang="en-US" sz="2800" dirty="0" smtClean="0"/>
+              <a:t>character interaction</a:t>
+            </a:r>
+            <a:endParaRPr lang="en-US" sz="2800" dirty="0" smtClean="0"/>
           </a:p>
           <a:p>
             <a:pPr>
@@ -3998,7 +4293,7 @@
               <a:buChar char="o"/>
             </a:pPr>
             <a:r>
-              <a:rPr lang="en-US" dirty="0" smtClean="0"/>
+              <a:rPr lang="en-US" sz="2800" dirty="0" smtClean="0"/>
               <a:t>To consist of one island with multiple enemies for player to conquer</a:t>
             </a:r>
           </a:p>
@@ -4008,7 +4303,7 @@
               <a:buChar char="o"/>
             </a:pPr>
             <a:r>
-              <a:rPr lang="en-US" dirty="0" smtClean="0"/>
+              <a:rPr lang="en-US" sz="2800" dirty="0" smtClean="0"/>
               <a:t>One non-player-controlled character to interact with</a:t>
             </a:r>
           </a:p>
@@ -4018,10 +4313,10 @@
               <a:buChar char="o"/>
             </a:pPr>
             <a:r>
-              <a:rPr lang="en-US" dirty="0" smtClean="0"/>
+              <a:rPr lang="en-US" sz="2800" dirty="0" smtClean="0"/>
               <a:t>Environment to explore</a:t>
             </a:r>
-            <a:endParaRPr lang="en-US" dirty="0"/>
+            <a:endParaRPr lang="en-US" sz="2800" dirty="0"/>
           </a:p>
         </p:txBody>
       </p:sp>
@@ -4035,6 +4330,13 @@
   <p:clrMapOvr>
     <a:masterClrMapping/>
   </p:clrMapOvr>
+  <p:timing>
+    <p:tnLst>
+      <p:par>
+        <p:cTn id="1" dur="indefinite" restart="never" nodeType="tmRoot"/>
+      </p:par>
+    </p:tnLst>
+  </p:timing>
 </p:sld>
 </file>
 
@@ -4098,7 +4400,7 @@
               <a:buChar char="o"/>
             </a:pPr>
             <a:r>
-              <a:rPr lang="en-US" dirty="0" smtClean="0"/>
+              <a:rPr lang="en-US" sz="2800" dirty="0" smtClean="0"/>
               <a:t>Team &amp; Environmental Lead: Jonathan Nabors</a:t>
             </a:r>
           </a:p>
@@ -4108,14 +4410,14 @@
               <a:buChar char="o"/>
             </a:pPr>
             <a:r>
-              <a:rPr lang="en-US" dirty="0" smtClean="0"/>
+              <a:rPr lang="en-US" sz="2800" dirty="0" smtClean="0"/>
               <a:t>Character Design Lead: Anthony </a:t>
             </a:r>
             <a:r>
-              <a:rPr lang="en-US" dirty="0" err="1" smtClean="0"/>
+              <a:rPr lang="en-US" sz="2800" dirty="0" err="1" smtClean="0"/>
               <a:t>Jamora</a:t>
             </a:r>
-            <a:endParaRPr lang="en-US" dirty="0" smtClean="0"/>
+            <a:endParaRPr lang="en-US" sz="2800" dirty="0" smtClean="0"/>
           </a:p>
           <a:p>
             <a:pPr>
@@ -4123,7 +4425,7 @@
               <a:buChar char="o"/>
             </a:pPr>
             <a:r>
-              <a:rPr lang="en-US" dirty="0" smtClean="0"/>
+              <a:rPr lang="en-US" sz="2800" dirty="0" smtClean="0"/>
               <a:t>Gameplay Engineer: Thomas Burke</a:t>
             </a:r>
           </a:p>
@@ -4135,6 +4437,33 @@
           </a:p>
         </p:txBody>
       </p:sp>
+      <p:pic>
+        <p:nvPicPr>
+          <p:cNvPr id="4" name="Shape 106"/>
+          <p:cNvPicPr preferRelativeResize="0"/>
+          <p:nvPr/>
+        </p:nvPicPr>
+        <p:blipFill rotWithShape="1">
+          <a:blip r:embed="rId2">
+            <a:alphaModFix/>
+          </a:blip>
+          <a:srcRect/>
+          <a:stretch/>
+        </p:blipFill>
+        <p:spPr>
+          <a:xfrm>
+            <a:off x="6958584" y="2834949"/>
+            <a:ext cx="4197096" cy="3034145"/>
+          </a:xfrm>
+          <a:prstGeom prst="rect">
+            <a:avLst/>
+          </a:prstGeom>
+          <a:noFill/>
+          <a:ln>
+            <a:noFill/>
+          </a:ln>
+        </p:spPr>
+      </p:pic>
     </p:spTree>
     <p:extLst>
       <p:ext uri="{BB962C8B-B14F-4D97-AF65-F5344CB8AC3E}">
@@ -4145,6 +4474,13 @@
   <p:clrMapOvr>
     <a:masterClrMapping/>
   </p:clrMapOvr>
+  <p:timing>
+    <p:tnLst>
+      <p:par>
+        <p:cTn id="1" dur="indefinite" restart="never" nodeType="tmRoot"/>
+      </p:par>
+    </p:tnLst>
+  </p:timing>
 </p:sld>
 </file>
 
@@ -4200,7 +4536,9 @@
         </p:nvSpPr>
         <p:spPr/>
         <p:txBody>
-          <a:bodyPr/>
+          <a:bodyPr anchor="ctr">
+            <a:normAutofit/>
+          </a:bodyPr>
           <a:lstStyle/>
           <a:p>
             <a:pPr>
@@ -4208,7 +4546,7 @@
               <a:buChar char="o"/>
             </a:pPr>
             <a:r>
-              <a:rPr lang="en-US" dirty="0" smtClean="0"/>
+              <a:rPr lang="en-US" sz="2800" dirty="0" smtClean="0"/>
               <a:t>Policy to complete all deliverables 12 hours before due date</a:t>
             </a:r>
           </a:p>
@@ -4218,7 +4556,7 @@
               <a:buChar char="o"/>
             </a:pPr>
             <a:r>
-              <a:rPr lang="en-US" dirty="0" smtClean="0"/>
+              <a:rPr lang="en-US" sz="2800" dirty="0" smtClean="0"/>
               <a:t>Team lead to reach out to members failing to meet deadline</a:t>
             </a:r>
           </a:p>
@@ -4228,7 +4566,7 @@
               <a:buChar char="o"/>
             </a:pPr>
             <a:r>
-              <a:rPr lang="en-US" dirty="0" smtClean="0"/>
+              <a:rPr lang="en-US" sz="2800" dirty="0" smtClean="0"/>
               <a:t>If problem not resolved 6 hours prior to due date, team lead to reach out to TA/Instructors</a:t>
             </a:r>
           </a:p>
@@ -4238,10 +4576,10 @@
               <a:buChar char="o"/>
             </a:pPr>
             <a:r>
-              <a:rPr lang="en-US" dirty="0" smtClean="0"/>
+              <a:rPr lang="en-US" sz="2800" dirty="0" smtClean="0"/>
               <a:t>Request meeting between team members and TA/Instructors to ensure problem does not repeat</a:t>
             </a:r>
-            <a:endParaRPr lang="en-US" dirty="0"/>
+            <a:endParaRPr lang="en-US" sz="2800" dirty="0"/>
           </a:p>
         </p:txBody>
       </p:sp>
@@ -4255,6 +4593,13 @@
   <p:clrMapOvr>
     <a:masterClrMapping/>
   </p:clrMapOvr>
+  <p:timing>
+    <p:tnLst>
+      <p:par>
+        <p:cTn id="1" dur="indefinite" restart="never" nodeType="tmRoot"/>
+      </p:par>
+    </p:tnLst>
+  </p:timing>
 </p:sld>
 </file>
 
@@ -4310,7 +4655,9 @@
         </p:nvSpPr>
         <p:spPr/>
         <p:txBody>
-          <a:bodyPr/>
+          <a:bodyPr anchor="ctr">
+            <a:normAutofit/>
+          </a:bodyPr>
           <a:lstStyle/>
           <a:p>
             <a:pPr>
@@ -4318,7 +4665,7 @@
               <a:buChar char="o"/>
             </a:pPr>
             <a:r>
-              <a:rPr lang="en-US" dirty="0" smtClean="0"/>
+              <a:rPr lang="en-US" sz="2400" dirty="0" smtClean="0"/>
               <a:t>First meeting, January 28</a:t>
             </a:r>
           </a:p>
@@ -4328,7 +4675,7 @@
               <a:buChar char="o"/>
             </a:pPr>
             <a:r>
-              <a:rPr lang="en-US" dirty="0" smtClean="0"/>
+              <a:rPr lang="en-US" sz="2400" dirty="0" smtClean="0"/>
               <a:t>Phase One, January 28 – March 2</a:t>
             </a:r>
           </a:p>
@@ -4338,7 +4685,7 @@
               <a:buChar char="o"/>
             </a:pPr>
             <a:r>
-              <a:rPr lang="en-US" dirty="0" smtClean="0"/>
+              <a:rPr lang="en-US" sz="2400" dirty="0" smtClean="0"/>
               <a:t>First Prototype, March 3</a:t>
             </a:r>
           </a:p>
@@ -4348,7 +4695,7 @@
               <a:buChar char="o"/>
             </a:pPr>
             <a:r>
-              <a:rPr lang="en-US" dirty="0" smtClean="0"/>
+              <a:rPr lang="en-US" sz="2400" dirty="0" smtClean="0"/>
               <a:t>Phase Two, March 3 – March 30</a:t>
             </a:r>
           </a:p>
@@ -4358,7 +4705,7 @@
               <a:buChar char="o"/>
             </a:pPr>
             <a:r>
-              <a:rPr lang="en-US" dirty="0" smtClean="0"/>
+              <a:rPr lang="en-US" sz="2400" dirty="0" smtClean="0"/>
               <a:t>Second Prototype, March 31</a:t>
             </a:r>
           </a:p>
@@ -4368,10 +4715,10 @@
               <a:buChar char="o"/>
             </a:pPr>
             <a:r>
-              <a:rPr lang="en-US" dirty="0" smtClean="0"/>
+              <a:rPr lang="en-US" sz="2400" dirty="0" smtClean="0"/>
               <a:t>Project Completion, April 21</a:t>
             </a:r>
-            <a:endParaRPr lang="en-US" dirty="0"/>
+            <a:endParaRPr lang="en-US" sz="2400" dirty="0"/>
           </a:p>
         </p:txBody>
       </p:sp>
@@ -4385,9 +4732,16 @@
             <p:ph sz="half" idx="2"/>
           </p:nvPr>
         </p:nvSpPr>
-        <p:spPr/>
-        <p:txBody>
-          <a:bodyPr/>
+        <p:spPr>
+          <a:xfrm>
+            <a:off x="5431536" y="1845735"/>
+            <a:ext cx="5724144" cy="4023360"/>
+          </a:xfrm>
+        </p:spPr>
+        <p:txBody>
+          <a:bodyPr anchor="ctr">
+            <a:noAutofit/>
+          </a:bodyPr>
           <a:lstStyle/>
           <a:p>
             <a:pPr>
@@ -4395,7 +4749,7 @@
               <a:buChar char="•"/>
             </a:pPr>
             <a:r>
-              <a:rPr lang="en-US" dirty="0" smtClean="0"/>
+              <a:rPr lang="en-US" sz="2400" dirty="0" smtClean="0"/>
               <a:t>To discuss initial deliverables</a:t>
             </a:r>
           </a:p>
@@ -4405,7 +4759,7 @@
               <a:buChar char="•"/>
             </a:pPr>
             <a:r>
-              <a:rPr lang="en-US" dirty="0" smtClean="0"/>
+              <a:rPr lang="en-US" sz="2400" dirty="0" smtClean="0"/>
               <a:t>Project organization &amp; initial development</a:t>
             </a:r>
           </a:p>
@@ -4415,7 +4769,7 @@
               <a:buChar char="•"/>
             </a:pPr>
             <a:r>
-              <a:rPr lang="en-US" dirty="0" smtClean="0"/>
+              <a:rPr lang="en-US" sz="2400" dirty="0" smtClean="0"/>
               <a:t>Functional demo with gameplay &amp; sound</a:t>
             </a:r>
           </a:p>
@@ -4425,7 +4779,7 @@
               <a:buChar char="•"/>
             </a:pPr>
             <a:r>
-              <a:rPr lang="en-US" dirty="0" smtClean="0"/>
+              <a:rPr lang="en-US" sz="2400" dirty="0" smtClean="0"/>
               <a:t>Improve on prototype </a:t>
             </a:r>
           </a:p>
@@ -4435,7 +4789,7 @@
               <a:buChar char="•"/>
             </a:pPr>
             <a:r>
-              <a:rPr lang="en-US" dirty="0" smtClean="0"/>
+              <a:rPr lang="en-US" sz="2400" dirty="0" smtClean="0"/>
               <a:t>Stronger demo with better gameplay</a:t>
             </a:r>
           </a:p>
@@ -4445,10 +4799,10 @@
               <a:buChar char="•"/>
             </a:pPr>
             <a:r>
-              <a:rPr lang="en-US" dirty="0" smtClean="0"/>
+              <a:rPr lang="en-US" sz="2400" dirty="0" smtClean="0"/>
               <a:t>Fully implemented demo</a:t>
             </a:r>
-            <a:endParaRPr lang="en-US" dirty="0"/>
+            <a:endParaRPr lang="en-US" sz="2400" dirty="0"/>
           </a:p>
         </p:txBody>
       </p:sp>
@@ -4462,6 +4816,13 @@
   <p:clrMapOvr>
     <a:masterClrMapping/>
   </p:clrMapOvr>
+  <p:timing>
+    <p:tnLst>
+      <p:par>
+        <p:cTn id="1" dur="indefinite" restart="never" nodeType="tmRoot"/>
+      </p:par>
+    </p:tnLst>
+  </p:timing>
 </p:sld>
 </file>
 
@@ -4517,7 +4878,9 @@
         </p:nvSpPr>
         <p:spPr/>
         <p:txBody>
-          <a:bodyPr/>
+          <a:bodyPr>
+            <a:normAutofit/>
+          </a:bodyPr>
           <a:lstStyle/>
           <a:p>
             <a:pPr>
@@ -4525,7 +4888,7 @@
               <a:buChar char="o"/>
             </a:pPr>
             <a:r>
-              <a:rPr lang="en-US" dirty="0" smtClean="0"/>
+              <a:rPr lang="en-US" sz="2800" dirty="0" smtClean="0"/>
               <a:t>Using password protected repository</a:t>
             </a:r>
           </a:p>
@@ -4535,7 +4898,7 @@
               <a:buChar char="o"/>
             </a:pPr>
             <a:r>
-              <a:rPr lang="en-US" dirty="0" smtClean="0"/>
+              <a:rPr lang="en-US" sz="2800" dirty="0" smtClean="0"/>
               <a:t>Ability for client to monitor progress of development</a:t>
             </a:r>
           </a:p>
@@ -4545,7 +4908,7 @@
               <a:buChar char="o"/>
             </a:pPr>
             <a:r>
-              <a:rPr lang="en-US" dirty="0" smtClean="0"/>
+              <a:rPr lang="en-US" sz="2800" dirty="0" smtClean="0"/>
               <a:t>Shared Google Drive for asset management</a:t>
             </a:r>
           </a:p>
@@ -4555,13 +4918,40 @@
               <a:buChar char="o"/>
             </a:pPr>
             <a:r>
-              <a:rPr lang="en-US" dirty="0" smtClean="0"/>
+              <a:rPr lang="en-US" sz="2800" dirty="0" smtClean="0"/>
               <a:t>Shared email address</a:t>
             </a:r>
-            <a:endParaRPr lang="en-US" dirty="0"/>
-          </a:p>
-        </p:txBody>
-      </p:sp>
+            <a:endParaRPr lang="en-US" sz="2800" dirty="0"/>
+          </a:p>
+        </p:txBody>
+      </p:sp>
+      <p:pic>
+        <p:nvPicPr>
+          <p:cNvPr id="4" name="Shape 93"/>
+          <p:cNvPicPr preferRelativeResize="0"/>
+          <p:nvPr/>
+        </p:nvPicPr>
+        <p:blipFill rotWithShape="1">
+          <a:blip r:embed="rId2">
+            <a:alphaModFix/>
+          </a:blip>
+          <a:srcRect/>
+          <a:stretch/>
+        </p:blipFill>
+        <p:spPr>
+          <a:xfrm>
+            <a:off x="9222106" y="2449620"/>
+            <a:ext cx="1933574" cy="3419474"/>
+          </a:xfrm>
+          <a:prstGeom prst="rect">
+            <a:avLst/>
+          </a:prstGeom>
+          <a:noFill/>
+          <a:ln>
+            <a:noFill/>
+          </a:ln>
+        </p:spPr>
+      </p:pic>
     </p:spTree>
     <p:extLst>
       <p:ext uri="{BB962C8B-B14F-4D97-AF65-F5344CB8AC3E}">
@@ -4572,6 +4962,13 @@
   <p:clrMapOvr>
     <a:masterClrMapping/>
   </p:clrMapOvr>
+  <p:timing>
+    <p:tnLst>
+      <p:par>
+        <p:cTn id="1" dur="indefinite" restart="never" nodeType="tmRoot"/>
+      </p:par>
+    </p:tnLst>
+  </p:timing>
 </p:sld>
 </file>
 
@@ -4592,6 +4989,33 @@
           <a:chExt cx="0" cy="0"/>
         </a:xfrm>
       </p:grpSpPr>
+      <p:pic>
+        <p:nvPicPr>
+          <p:cNvPr id="6" name="Shape 40"/>
+          <p:cNvPicPr preferRelativeResize="0"/>
+          <p:nvPr/>
+        </p:nvPicPr>
+        <p:blipFill rotWithShape="1">
+          <a:blip r:embed="rId2">
+            <a:alphaModFix/>
+          </a:blip>
+          <a:srcRect/>
+          <a:stretch/>
+        </p:blipFill>
+        <p:spPr>
+          <a:xfrm>
+            <a:off x="4386660" y="2143396"/>
+            <a:ext cx="3725698" cy="3725698"/>
+          </a:xfrm>
+          <a:prstGeom prst="rect">
+            <a:avLst/>
+          </a:prstGeom>
+          <a:noFill/>
+          <a:ln>
+            <a:noFill/>
+          </a:ln>
+        </p:spPr>
+      </p:pic>
       <p:sp>
         <p:nvSpPr>
           <p:cNvPr id="2" name="Title 1"/>
@@ -4635,7 +5059,7 @@
               <a:buChar char="o"/>
             </a:pPr>
             <a:r>
-              <a:rPr lang="en-US" dirty="0" smtClean="0"/>
+              <a:rPr lang="en-US" sz="2800" dirty="0" smtClean="0"/>
               <a:t>Game created in Unity Game Engine</a:t>
             </a:r>
           </a:p>
@@ -4645,11 +5069,11 @@
               <a:buChar char="o"/>
             </a:pPr>
             <a:r>
-              <a:rPr lang="en-US" dirty="0" err="1" smtClean="0"/>
+              <a:rPr lang="en-US" sz="2800" dirty="0" err="1" smtClean="0"/>
               <a:t>MonoDevelop</a:t>
             </a:r>
             <a:r>
-              <a:rPr lang="en-US" dirty="0" smtClean="0"/>
+              <a:rPr lang="en-US" sz="2800" dirty="0" smtClean="0"/>
               <a:t> for scripted events</a:t>
             </a:r>
           </a:p>
@@ -4659,11 +5083,11 @@
               <a:buChar char="o"/>
             </a:pPr>
             <a:r>
-              <a:rPr lang="en-US" dirty="0" err="1" smtClean="0"/>
+              <a:rPr lang="en-US" sz="2800" dirty="0" err="1" smtClean="0"/>
               <a:t>SourceTree</a:t>
             </a:r>
             <a:r>
-              <a:rPr lang="en-US" dirty="0" smtClean="0"/>
+              <a:rPr lang="en-US" sz="2800" dirty="0" smtClean="0"/>
               <a:t> for version control</a:t>
             </a:r>
           </a:p>
@@ -4675,6 +5099,33 @@
           </a:p>
         </p:txBody>
       </p:sp>
+      <p:pic>
+        <p:nvPicPr>
+          <p:cNvPr id="4" name="Shape 94"/>
+          <p:cNvPicPr preferRelativeResize="0"/>
+          <p:nvPr/>
+        </p:nvPicPr>
+        <p:blipFill rotWithShape="1">
+          <a:blip r:embed="rId3">
+            <a:alphaModFix/>
+          </a:blip>
+          <a:srcRect/>
+          <a:stretch/>
+        </p:blipFill>
+        <p:spPr>
+          <a:xfrm>
+            <a:off x="9092630" y="1737360"/>
+            <a:ext cx="2127058" cy="3584448"/>
+          </a:xfrm>
+          <a:prstGeom prst="rect">
+            <a:avLst/>
+          </a:prstGeom>
+          <a:noFill/>
+          <a:ln>
+            <a:noFill/>
+          </a:ln>
+        </p:spPr>
+      </p:pic>
     </p:spTree>
     <p:extLst>
       <p:ext uri="{BB962C8B-B14F-4D97-AF65-F5344CB8AC3E}">
@@ -4685,6 +5136,13 @@
   <p:clrMapOvr>
     <a:masterClrMapping/>
   </p:clrMapOvr>
+  <p:timing>
+    <p:tnLst>
+      <p:par>
+        <p:cTn id="1" dur="indefinite" restart="never" nodeType="tmRoot"/>
+      </p:par>
+    </p:tnLst>
+  </p:timing>
 </p:sld>
 </file>
 
@@ -4969,4 +5427,265 @@
     </a:ext>
   </a:extLst>
 </a:theme>
+</file>
+
+<file path=ppt/theme/theme2.xml><?xml version="1.0" encoding="utf-8"?>
+<a:theme xmlns:a="http://schemas.openxmlformats.org/drawingml/2006/main" name="Office Theme">
+  <a:themeElements>
+    <a:clrScheme name="Office">
+      <a:dk1>
+        <a:sysClr val="windowText" lastClr="000000"/>
+      </a:dk1>
+      <a:lt1>
+        <a:sysClr val="window" lastClr="FFFFFF"/>
+      </a:lt1>
+      <a:dk2>
+        <a:srgbClr val="44546A"/>
+      </a:dk2>
+      <a:lt2>
+        <a:srgbClr val="E7E6E6"/>
+      </a:lt2>
+      <a:accent1>
+        <a:srgbClr val="5B9BD5"/>
+      </a:accent1>
+      <a:accent2>
+        <a:srgbClr val="ED7D31"/>
+      </a:accent2>
+      <a:accent3>
+        <a:srgbClr val="A5A5A5"/>
+      </a:accent3>
+      <a:accent4>
+        <a:srgbClr val="FFC000"/>
+      </a:accent4>
+      <a:accent5>
+        <a:srgbClr val="4472C4"/>
+      </a:accent5>
+      <a:accent6>
+        <a:srgbClr val="70AD47"/>
+      </a:accent6>
+      <a:hlink>
+        <a:srgbClr val="0563C1"/>
+      </a:hlink>
+      <a:folHlink>
+        <a:srgbClr val="954F72"/>
+      </a:folHlink>
+    </a:clrScheme>
+    <a:fontScheme name="Office">
+      <a:majorFont>
+        <a:latin typeface="Calibri Light" panose="020F0302020204030204"/>
+        <a:ea typeface=""/>
+        <a:cs typeface=""/>
+        <a:font script="Jpan" typeface="ＭＳ Ｐゴシック"/>
+        <a:font script="Hang" typeface="맑은 고딕"/>
+        <a:font script="Hans" typeface="宋体"/>
+        <a:font script="Hant" typeface="新細明體"/>
+        <a:font script="Arab" typeface="Times New Roman"/>
+        <a:font script="Hebr" typeface="Times New Roman"/>
+        <a:font script="Thai" typeface="Angsana New"/>
+        <a:font script="Ethi" typeface="Nyala"/>
+        <a:font script="Beng" typeface="Vrinda"/>
+        <a:font script="Gujr" typeface="Shruti"/>
+        <a:font script="Khmr" typeface="MoolBoran"/>
+        <a:font script="Knda" typeface="Tunga"/>
+        <a:font script="Guru" typeface="Raavi"/>
+        <a:font script="Cans" typeface="Euphemia"/>
+        <a:font script="Cher" typeface="Plantagenet Cherokee"/>
+        <a:font script="Yiii" typeface="Microsoft Yi Baiti"/>
+        <a:font script="Tibt" typeface="Microsoft Himalaya"/>
+        <a:font script="Thaa" typeface="MV Boli"/>
+        <a:font script="Deva" typeface="Mangal"/>
+        <a:font script="Telu" typeface="Gautami"/>
+        <a:font script="Taml" typeface="Latha"/>
+        <a:font script="Syrc" typeface="Estrangelo Edessa"/>
+        <a:font script="Orya" typeface="Kalinga"/>
+        <a:font script="Mlym" typeface="Kartika"/>
+        <a:font script="Laoo" typeface="DokChampa"/>
+        <a:font script="Sinh" typeface="Iskoola Pota"/>
+        <a:font script="Mong" typeface="Mongolian Baiti"/>
+        <a:font script="Viet" typeface="Times New Roman"/>
+        <a:font script="Uigh" typeface="Microsoft Uighur"/>
+        <a:font script="Geor" typeface="Sylfaen"/>
+      </a:majorFont>
+      <a:minorFont>
+        <a:latin typeface="Calibri" panose="020F0502020204030204"/>
+        <a:ea typeface=""/>
+        <a:cs typeface=""/>
+        <a:font script="Jpan" typeface="ＭＳ Ｐゴシック"/>
+        <a:font script="Hang" typeface="맑은 고딕"/>
+        <a:font script="Hans" typeface="宋体"/>
+        <a:font script="Hant" typeface="新細明體"/>
+        <a:font script="Arab" typeface="Arial"/>
+        <a:font script="Hebr" typeface="Arial"/>
+        <a:font script="Thai" typeface="Cordia New"/>
+        <a:font script="Ethi" typeface="Nyala"/>
+        <a:font script="Beng" typeface="Vrinda"/>
+        <a:font script="Gujr" typeface="Shruti"/>
+        <a:font script="Khmr" typeface="DaunPenh"/>
+        <a:font script="Knda" typeface="Tunga"/>
+        <a:font script="Guru" typeface="Raavi"/>
+        <a:font script="Cans" typeface="Euphemia"/>
+        <a:font script="Cher" typeface="Plantagenet Cherokee"/>
+        <a:font script="Yiii" typeface="Microsoft Yi Baiti"/>
+        <a:font script="Tibt" typeface="Microsoft Himalaya"/>
+        <a:font script="Thaa" typeface="MV Boli"/>
+        <a:font script="Deva" typeface="Mangal"/>
+        <a:font script="Telu" typeface="Gautami"/>
+        <a:font script="Taml" typeface="Latha"/>
+        <a:font script="Syrc" typeface="Estrangelo Edessa"/>
+        <a:font script="Orya" typeface="Kalinga"/>
+        <a:font script="Mlym" typeface="Kartika"/>
+        <a:font script="Laoo" typeface="DokChampa"/>
+        <a:font script="Sinh" typeface="Iskoola Pota"/>
+        <a:font script="Mong" typeface="Mongolian Baiti"/>
+        <a:font script="Viet" typeface="Arial"/>
+        <a:font script="Uigh" typeface="Microsoft Uighur"/>
+        <a:font script="Geor" typeface="Sylfaen"/>
+      </a:minorFont>
+    </a:fontScheme>
+    <a:fmtScheme name="Office">
+      <a:fillStyleLst>
+        <a:solidFill>
+          <a:schemeClr val="phClr"/>
+        </a:solidFill>
+        <a:gradFill rotWithShape="1">
+          <a:gsLst>
+            <a:gs pos="0">
+              <a:schemeClr val="phClr">
+                <a:lumMod val="110000"/>
+                <a:satMod val="105000"/>
+                <a:tint val="67000"/>
+              </a:schemeClr>
+            </a:gs>
+            <a:gs pos="50000">
+              <a:schemeClr val="phClr">
+                <a:lumMod val="105000"/>
+                <a:satMod val="103000"/>
+                <a:tint val="73000"/>
+              </a:schemeClr>
+            </a:gs>
+            <a:gs pos="100000">
+              <a:schemeClr val="phClr">
+                <a:lumMod val="105000"/>
+                <a:satMod val="109000"/>
+                <a:tint val="81000"/>
+              </a:schemeClr>
+            </a:gs>
+          </a:gsLst>
+          <a:lin ang="5400000" scaled="0"/>
+        </a:gradFill>
+        <a:gradFill rotWithShape="1">
+          <a:gsLst>
+            <a:gs pos="0">
+              <a:schemeClr val="phClr">
+                <a:satMod val="103000"/>
+                <a:lumMod val="102000"/>
+                <a:tint val="94000"/>
+              </a:schemeClr>
+            </a:gs>
+            <a:gs pos="50000">
+              <a:schemeClr val="phClr">
+                <a:satMod val="110000"/>
+                <a:lumMod val="100000"/>
+                <a:shade val="100000"/>
+              </a:schemeClr>
+            </a:gs>
+            <a:gs pos="100000">
+              <a:schemeClr val="phClr">
+                <a:lumMod val="99000"/>
+                <a:satMod val="120000"/>
+                <a:shade val="78000"/>
+              </a:schemeClr>
+            </a:gs>
+          </a:gsLst>
+          <a:lin ang="5400000" scaled="0"/>
+        </a:gradFill>
+      </a:fillStyleLst>
+      <a:lnStyleLst>
+        <a:ln w="6350" cap="flat" cmpd="sng" algn="ctr">
+          <a:solidFill>
+            <a:schemeClr val="phClr"/>
+          </a:solidFill>
+          <a:prstDash val="solid"/>
+          <a:miter lim="800000"/>
+        </a:ln>
+        <a:ln w="12700" cap="flat" cmpd="sng" algn="ctr">
+          <a:solidFill>
+            <a:schemeClr val="phClr"/>
+          </a:solidFill>
+          <a:prstDash val="solid"/>
+          <a:miter lim="800000"/>
+        </a:ln>
+        <a:ln w="19050" cap="flat" cmpd="sng" algn="ctr">
+          <a:solidFill>
+            <a:schemeClr val="phClr"/>
+          </a:solidFill>
+          <a:prstDash val="solid"/>
+          <a:miter lim="800000"/>
+        </a:ln>
+      </a:lnStyleLst>
+      <a:effectStyleLst>
+        <a:effectStyle>
+          <a:effectLst/>
+        </a:effectStyle>
+        <a:effectStyle>
+          <a:effectLst/>
+        </a:effectStyle>
+        <a:effectStyle>
+          <a:effectLst>
+            <a:outerShdw blurRad="57150" dist="19050" dir="5400000" algn="ctr" rotWithShape="0">
+              <a:srgbClr val="000000">
+                <a:alpha val="63000"/>
+              </a:srgbClr>
+            </a:outerShdw>
+          </a:effectLst>
+        </a:effectStyle>
+      </a:effectStyleLst>
+      <a:bgFillStyleLst>
+        <a:solidFill>
+          <a:schemeClr val="phClr"/>
+        </a:solidFill>
+        <a:solidFill>
+          <a:schemeClr val="phClr">
+            <a:tint val="95000"/>
+            <a:satMod val="170000"/>
+          </a:schemeClr>
+        </a:solidFill>
+        <a:gradFill rotWithShape="1">
+          <a:gsLst>
+            <a:gs pos="0">
+              <a:schemeClr val="phClr">
+                <a:tint val="93000"/>
+                <a:satMod val="150000"/>
+                <a:shade val="98000"/>
+                <a:lumMod val="102000"/>
+              </a:schemeClr>
+            </a:gs>
+            <a:gs pos="50000">
+              <a:schemeClr val="phClr">
+                <a:tint val="98000"/>
+                <a:satMod val="130000"/>
+                <a:shade val="90000"/>
+                <a:lumMod val="103000"/>
+              </a:schemeClr>
+            </a:gs>
+            <a:gs pos="100000">
+              <a:schemeClr val="phClr">
+                <a:shade val="63000"/>
+                <a:satMod val="120000"/>
+              </a:schemeClr>
+            </a:gs>
+          </a:gsLst>
+          <a:lin ang="5400000" scaled="0"/>
+        </a:gradFill>
+      </a:bgFillStyleLst>
+    </a:fmtScheme>
+  </a:themeElements>
+  <a:objectDefaults/>
+  <a:extraClrSchemeLst/>
+  <a:extLst>
+    <a:ext uri="{05A4C25C-085E-4340-85A3-A5531E510DB2}">
+      <thm15:themeFamily xmlns:thm15="http://schemas.microsoft.com/office/thememl/2012/main" name="Office Theme" id="{62F939B6-93AF-4DB8-9C6B-D6C7DFDC589F}" vid="{4A3C46E8-61CC-4603-A589-7422A47A8E4A}"/>
+    </a:ext>
+  </a:extLst>
+</a:theme>
 </file>
</xml_diff>